<commit_message>
iniciando com o artigo
</commit_message>
<xml_diff>
--- a/powerPoint_bigData.pptx
+++ b/powerPoint_bigData.pptx
@@ -6,11 +6,12 @@
   </p:sldMasterIdLst>
   <p:sldIdLst>
     <p:sldId id="256" r:id="rId5"/>
+    <p:sldId id="257" r:id="rId6"/>
   </p:sldIdLst>
   <p:sldSz cx="12192000" cy="6858000"/>
   <p:notesSz cx="6858000" cy="9144000"/>
   <p:custDataLst>
-    <p:tags r:id="rId6"/>
+    <p:tags r:id="rId7"/>
   </p:custDataLst>
   <p:defaultTextStyle>
     <a:defPPr>
@@ -270,7 +271,7 @@
           <a:p>
             <a:fld id="{37A2730A-859E-B540-ADF3-E97069AD1FDB}" type="datetimeFigureOut">
               <a:rPr lang="en-US" smtClean="0"/>
-              <a:t>5/17/2024</a:t>
+              <a:t>5/23/2024</a:t>
             </a:fld>
             <a:endParaRPr lang="en-US"/>
           </a:p>
@@ -468,7 +469,7 @@
           <a:p>
             <a:fld id="{37A2730A-859E-B540-ADF3-E97069AD1FDB}" type="datetimeFigureOut">
               <a:rPr lang="en-US" smtClean="0"/>
-              <a:t>5/17/2024</a:t>
+              <a:t>5/23/2024</a:t>
             </a:fld>
             <a:endParaRPr lang="en-US"/>
           </a:p>
@@ -676,7 +677,7 @@
           <a:p>
             <a:fld id="{37A2730A-859E-B540-ADF3-E97069AD1FDB}" type="datetimeFigureOut">
               <a:rPr lang="en-US" smtClean="0"/>
-              <a:t>5/17/2024</a:t>
+              <a:t>5/23/2024</a:t>
             </a:fld>
             <a:endParaRPr lang="en-US"/>
           </a:p>
@@ -874,7 +875,7 @@
           <a:p>
             <a:fld id="{37A2730A-859E-B540-ADF3-E97069AD1FDB}" type="datetimeFigureOut">
               <a:rPr lang="en-US" smtClean="0"/>
-              <a:t>5/17/2024</a:t>
+              <a:t>5/23/2024</a:t>
             </a:fld>
             <a:endParaRPr lang="en-US"/>
           </a:p>
@@ -1149,7 +1150,7 @@
           <a:p>
             <a:fld id="{37A2730A-859E-B540-ADF3-E97069AD1FDB}" type="datetimeFigureOut">
               <a:rPr lang="en-US" smtClean="0"/>
-              <a:t>5/17/2024</a:t>
+              <a:t>5/23/2024</a:t>
             </a:fld>
             <a:endParaRPr lang="en-US"/>
           </a:p>
@@ -1414,7 +1415,7 @@
           <a:p>
             <a:fld id="{37A2730A-859E-B540-ADF3-E97069AD1FDB}" type="datetimeFigureOut">
               <a:rPr lang="en-US" smtClean="0"/>
-              <a:t>5/17/2024</a:t>
+              <a:t>5/23/2024</a:t>
             </a:fld>
             <a:endParaRPr lang="en-US"/>
           </a:p>
@@ -1826,7 +1827,7 @@
           <a:p>
             <a:fld id="{37A2730A-859E-B540-ADF3-E97069AD1FDB}" type="datetimeFigureOut">
               <a:rPr lang="en-US" smtClean="0"/>
-              <a:t>5/17/2024</a:t>
+              <a:t>5/23/2024</a:t>
             </a:fld>
             <a:endParaRPr lang="en-US"/>
           </a:p>
@@ -1967,7 +1968,7 @@
           <a:p>
             <a:fld id="{37A2730A-859E-B540-ADF3-E97069AD1FDB}" type="datetimeFigureOut">
               <a:rPr lang="en-US" smtClean="0"/>
-              <a:t>5/17/2024</a:t>
+              <a:t>5/23/2024</a:t>
             </a:fld>
             <a:endParaRPr lang="en-US"/>
           </a:p>
@@ -2080,7 +2081,7 @@
           <a:p>
             <a:fld id="{37A2730A-859E-B540-ADF3-E97069AD1FDB}" type="datetimeFigureOut">
               <a:rPr lang="en-US" smtClean="0"/>
-              <a:t>5/17/2024</a:t>
+              <a:t>5/23/2024</a:t>
             </a:fld>
             <a:endParaRPr lang="en-US"/>
           </a:p>
@@ -2391,7 +2392,7 @@
           <a:p>
             <a:fld id="{37A2730A-859E-B540-ADF3-E97069AD1FDB}" type="datetimeFigureOut">
               <a:rPr lang="en-US" smtClean="0"/>
-              <a:t>5/17/2024</a:t>
+              <a:t>5/23/2024</a:t>
             </a:fld>
             <a:endParaRPr lang="en-US"/>
           </a:p>
@@ -2679,7 +2680,7 @@
           <a:p>
             <a:fld id="{37A2730A-859E-B540-ADF3-E97069AD1FDB}" type="datetimeFigureOut">
               <a:rPr lang="en-US" smtClean="0"/>
-              <a:t>5/17/2024</a:t>
+              <a:t>5/23/2024</a:t>
             </a:fld>
             <a:endParaRPr lang="en-US"/>
           </a:p>
@@ -2920,7 +2921,7 @@
           <a:p>
             <a:fld id="{37A2730A-859E-B540-ADF3-E97069AD1FDB}" type="datetimeFigureOut">
               <a:rPr lang="en-US" smtClean="0"/>
-              <a:t>5/17/2024</a:t>
+              <a:t>5/23/2024</a:t>
             </a:fld>
             <a:endParaRPr lang="en-US"/>
           </a:p>
@@ -3541,6 +3542,250 @@
     <p:extLst>
       <p:ext uri="{BB962C8B-B14F-4D97-AF65-F5344CB8AC3E}">
         <p14:creationId xmlns:p14="http://schemas.microsoft.com/office/powerpoint/2010/main" val="3211859542"/>
+      </p:ext>
+    </p:extLst>
+  </p:cSld>
+  <p:clrMapOvr>
+    <a:masterClrMapping/>
+  </p:clrMapOvr>
+</p:sld>
+</file>
+
+<file path=ppt/slides/slide2.xml><?xml version="1.0" encoding="utf-8"?>
+<p:sld xmlns:a="http://schemas.openxmlformats.org/drawingml/2006/main" xmlns:r="http://schemas.openxmlformats.org/officeDocument/2006/relationships" xmlns:p="http://schemas.openxmlformats.org/presentationml/2006/main">
+  <p:cSld>
+    <p:spTree>
+      <p:nvGrpSpPr>
+        <p:cNvPr id="1" name=""/>
+        <p:cNvGrpSpPr/>
+        <p:nvPr/>
+      </p:nvGrpSpPr>
+      <p:grpSpPr>
+        <a:xfrm>
+          <a:off x="0" y="0"/>
+          <a:ext cx="0" cy="0"/>
+          <a:chOff x="0" y="0"/>
+          <a:chExt cx="0" cy="0"/>
+        </a:xfrm>
+      </p:grpSpPr>
+      <p:sp>
+        <p:nvSpPr>
+          <p:cNvPr id="6" name="Add-in_Banner">
+            <a:extLst>
+              <a:ext uri="{FF2B5EF4-FFF2-40B4-BE49-F238E27FC236}">
+                <a16:creationId xmlns:a16="http://schemas.microsoft.com/office/drawing/2014/main" id="{3469E413-BCF5-4E2F-BE4B-EB617C589FA5}"/>
+              </a:ext>
+            </a:extLst>
+          </p:cNvPr>
+          <p:cNvSpPr txBox="1">
+            <a:spLocks noGrp="1"/>
+          </p:cNvSpPr>
+          <p:nvPr>
+            <p:ph type="title"/>
+          </p:nvPr>
+        </p:nvSpPr>
+        <p:spPr>
+          <a:xfrm>
+            <a:off x="0" y="78509"/>
+            <a:ext cx="12192000" cy="612815"/>
+          </a:xfrm>
+          <a:prstGeom prst="rect">
+            <a:avLst/>
+          </a:prstGeom>
+          <a:solidFill>
+            <a:srgbClr val="494748">
+              <a:alpha val="4706"/>
+            </a:srgbClr>
+          </a:solidFill>
+          <a:ln>
+            <a:noFill/>
+          </a:ln>
+        </p:spPr>
+        <p:style>
+          <a:lnRef idx="2">
+            <a:schemeClr val="accent1">
+              <a:shade val="50000"/>
+            </a:schemeClr>
+          </a:lnRef>
+          <a:fillRef idx="1">
+            <a:schemeClr val="accent1"/>
+          </a:fillRef>
+          <a:effectRef idx="0">
+            <a:schemeClr val="accent1"/>
+          </a:effectRef>
+          <a:fontRef idx="minor">
+            <a:schemeClr val="lt1"/>
+          </a:fontRef>
+        </p:style>
+        <p:txBody>
+          <a:bodyPr rot="0" spcFirstLastPara="0" vert="horz" wrap="square" lIns="1332000" tIns="180000" rIns="216000" bIns="180000" numCol="1" spcCol="0" rtlCol="0" fromWordArt="0" anchor="ctr" anchorCtr="0" forceAA="0" compatLnSpc="1">
+            <a:prstTxWarp prst="textNoShape">
+              <a:avLst/>
+            </a:prstTxWarp>
+            <a:spAutoFit/>
+          </a:bodyPr>
+          <a:lstStyle/>
+          <a:p>
+            <a:pPr algn="l" rtl="0">
+              <a:spcAft>
+                <a:spcPts val="0"/>
+              </a:spcAft>
+            </a:pPr>
+            <a:r>
+              <a:rPr lang="en-GB" sz="1800" dirty="0">
+                <a:solidFill>
+                  <a:srgbClr val="000000"/>
+                </a:solidFill>
+                <a:latin typeface="Segoe UI Light" panose="020B0502040204020203" pitchFamily="34" charset="0"/>
+                <a:ea typeface="Calibri" panose="020F0502020204030204" pitchFamily="34" charset="0"/>
+                <a:cs typeface="Segoe UI Light" panose="020B0502040204020203" pitchFamily="34" charset="0"/>
+              </a:rPr>
+              <a:t>    </a:t>
+            </a:r>
+            <a:r>
+              <a:rPr lang="en-GB" sz="1800" dirty="0" err="1">
+                <a:solidFill>
+                  <a:srgbClr val="000000"/>
+                </a:solidFill>
+                <a:effectLst/>
+                <a:latin typeface="Segoe UI Light" panose="020B0502040204020203" pitchFamily="34" charset="0"/>
+                <a:ea typeface="Calibri" panose="020F0502020204030204" pitchFamily="34" charset="0"/>
+                <a:cs typeface="Segoe UI Light" panose="020B0502040204020203" pitchFamily="34" charset="0"/>
+              </a:rPr>
+              <a:t>Uso</a:t>
+            </a:r>
+            <a:r>
+              <a:rPr lang="en-GB" sz="1800" dirty="0">
+                <a:solidFill>
+                  <a:srgbClr val="000000"/>
+                </a:solidFill>
+                <a:effectLst/>
+                <a:latin typeface="Segoe UI Light" panose="020B0502040204020203" pitchFamily="34" charset="0"/>
+                <a:ea typeface="Calibri" panose="020F0502020204030204" pitchFamily="34" charset="0"/>
+                <a:cs typeface="Segoe UI Light" panose="020B0502040204020203" pitchFamily="34" charset="0"/>
+              </a:rPr>
+              <a:t> do </a:t>
+            </a:r>
+            <a:r>
+              <a:rPr lang="en-GB" sz="1800" dirty="0" err="1">
+                <a:solidFill>
+                  <a:srgbClr val="000000"/>
+                </a:solidFill>
+                <a:effectLst/>
+                <a:latin typeface="Segoe UI Light" panose="020B0502040204020203" pitchFamily="34" charset="0"/>
+                <a:ea typeface="Calibri" panose="020F0502020204030204" pitchFamily="34" charset="0"/>
+                <a:cs typeface="Segoe UI Light" panose="020B0502040204020203" pitchFamily="34" charset="0"/>
+              </a:rPr>
+              <a:t>Streamlit</a:t>
+            </a:r>
+            <a:r>
+              <a:rPr lang="en-GB" sz="1800" dirty="0">
+                <a:solidFill>
+                  <a:srgbClr val="000000"/>
+                </a:solidFill>
+                <a:effectLst/>
+                <a:latin typeface="Segoe UI Light" panose="020B0502040204020203" pitchFamily="34" charset="0"/>
+                <a:ea typeface="Calibri" panose="020F0502020204030204" pitchFamily="34" charset="0"/>
+                <a:cs typeface="Segoe UI Light" panose="020B0502040204020203" pitchFamily="34" charset="0"/>
+              </a:rPr>
+              <a:t> para </a:t>
+            </a:r>
+            <a:r>
+              <a:rPr lang="en-GB" sz="1800" dirty="0" err="1">
+                <a:solidFill>
+                  <a:srgbClr val="000000"/>
+                </a:solidFill>
+                <a:effectLst/>
+                <a:latin typeface="Segoe UI Light" panose="020B0502040204020203" pitchFamily="34" charset="0"/>
+                <a:ea typeface="Calibri" panose="020F0502020204030204" pitchFamily="34" charset="0"/>
+                <a:cs typeface="Segoe UI Light" panose="020B0502040204020203" pitchFamily="34" charset="0"/>
+              </a:rPr>
+              <a:t>exibição</a:t>
+            </a:r>
+            <a:r>
+              <a:rPr lang="en-GB" sz="1800" dirty="0">
+                <a:solidFill>
+                  <a:srgbClr val="000000"/>
+                </a:solidFill>
+                <a:effectLst/>
+                <a:latin typeface="Segoe UI Light" panose="020B0502040204020203" pitchFamily="34" charset="0"/>
+                <a:ea typeface="Calibri" panose="020F0502020204030204" pitchFamily="34" charset="0"/>
+                <a:cs typeface="Segoe UI Light" panose="020B0502040204020203" pitchFamily="34" charset="0"/>
+              </a:rPr>
+              <a:t> de </a:t>
+            </a:r>
+            <a:r>
+              <a:rPr lang="en-GB" sz="1800" dirty="0" err="1">
+                <a:solidFill>
+                  <a:srgbClr val="000000"/>
+                </a:solidFill>
+                <a:effectLst/>
+                <a:latin typeface="Segoe UI Light" panose="020B0502040204020203" pitchFamily="34" charset="0"/>
+                <a:ea typeface="Calibri" panose="020F0502020204030204" pitchFamily="34" charset="0"/>
+                <a:cs typeface="Segoe UI Light" panose="020B0502040204020203" pitchFamily="34" charset="0"/>
+              </a:rPr>
+              <a:t>gráficos</a:t>
+            </a:r>
+            <a:endParaRPr lang="en-IE" sz="1200" dirty="0">
+              <a:effectLst/>
+              <a:latin typeface="Segoe UI Light" panose="020B0502040204020203" pitchFamily="34" charset="0"/>
+              <a:ea typeface="Calibri" panose="020F0502020204030204" pitchFamily="34" charset="0"/>
+              <a:cs typeface="Segoe UI Light" panose="020B0502040204020203" pitchFamily="34" charset="0"/>
+            </a:endParaRPr>
+          </a:p>
+        </p:txBody>
+      </p:sp>
+      <p:pic>
+        <p:nvPicPr>
+          <p:cNvPr id="1026" name="Picture 2" descr="New Data Science Project with Streamlit and Python - QUANTLABS.NET">
+            <a:extLst>
+              <a:ext uri="{FF2B5EF4-FFF2-40B4-BE49-F238E27FC236}">
+                <a16:creationId xmlns:a16="http://schemas.microsoft.com/office/drawing/2014/main" id="{1EEEBCF6-06BE-F363-6D03-3B9CF5772623}"/>
+              </a:ext>
+            </a:extLst>
+          </p:cNvPr>
+          <p:cNvPicPr>
+            <a:picLocks noChangeAspect="1" noChangeArrowheads="1"/>
+          </p:cNvPicPr>
+          <p:nvPr/>
+        </p:nvPicPr>
+        <p:blipFill>
+          <a:blip r:embed="rId2">
+            <a:extLst>
+              <a:ext uri="{28A0092B-C50C-407E-A947-70E740481C1C}">
+                <a14:useLocalDpi xmlns:a14="http://schemas.microsoft.com/office/drawing/2010/main" val="0"/>
+              </a:ext>
+            </a:extLst>
+          </a:blip>
+          <a:srcRect/>
+          <a:stretch>
+            <a:fillRect/>
+          </a:stretch>
+        </p:blipFill>
+        <p:spPr bwMode="auto">
+          <a:xfrm>
+            <a:off x="701779" y="78509"/>
+            <a:ext cx="868304" cy="508000"/>
+          </a:xfrm>
+          <a:prstGeom prst="rect">
+            <a:avLst/>
+          </a:prstGeom>
+          <a:noFill/>
+          <a:extLst>
+            <a:ext uri="{909E8E84-426E-40DD-AFC4-6F175D3DCCD1}">
+              <a14:hiddenFill xmlns:a14="http://schemas.microsoft.com/office/drawing/2010/main">
+                <a:solidFill>
+                  <a:srgbClr val="FFFFFF"/>
+                </a:solidFill>
+              </a14:hiddenFill>
+            </a:ext>
+          </a:extLst>
+        </p:spPr>
+      </p:pic>
+    </p:spTree>
+    <p:extLst>
+      <p:ext uri="{BB962C8B-B14F-4D97-AF65-F5344CB8AC3E}">
+        <p14:creationId xmlns:p14="http://schemas.microsoft.com/office/powerpoint/2010/main" val="275667803"/>
       </p:ext>
     </p:extLst>
   </p:cSld>
@@ -3881,24 +4126,6 @@
 </file>
 
 <file path=customXml/item1.xml><?xml version="1.0" encoding="utf-8"?>
-<p:properties xmlns:p="http://schemas.microsoft.com/office/2006/metadata/properties" xmlns:xsi="http://www.w3.org/2001/XMLSchema-instance" xmlns:pc="http://schemas.microsoft.com/office/infopath/2007/PartnerControls">
-  <documentManagement>
-    <Document_x0020_Purpose xmlns="f577acbf-5b0b-4b4f-9948-268e97f8d3a4">Informational</Document_x0020_Purpose>
-    <Initiatives xmlns="f577acbf-5b0b-4b4f-9948-268e97f8d3a4"/>
-  </documentManagement>
-</p:properties>
-</file>
-
-<file path=customXml/item2.xml><?xml version="1.0" encoding="utf-8"?>
-<?mso-contentType ?>
-<FormTemplates xmlns="http://schemas.microsoft.com/sharepoint/v3/contenttype/forms">
-  <Display>DocumentLibraryForm</Display>
-  <Edit>DocumentLibraryForm</Edit>
-  <New>DocumentLibraryForm</New>
-</FormTemplates>
-</file>
-
-<file path=customXml/item3.xml><?xml version="1.0" encoding="utf-8"?>
 <ct:contentTypeSchema xmlns:ct="http://schemas.microsoft.com/office/2006/metadata/contentType" xmlns:ma="http://schemas.microsoft.com/office/2006/metadata/properties/metaAttributes" ct:_="" ma:_="" ma:contentTypeName="Document" ma:contentTypeID="0x010100CD401524DC532D42A0E0ED886331A72B" ma:contentTypeVersion="15" ma:contentTypeDescription="Create a new document." ma:contentTypeScope="" ma:versionID="aba17d7263e5a17e1efe42a3571abb41">
   <xsd:schema xmlns:xsd="http://www.w3.org/2001/XMLSchema" xmlns:xs="http://www.w3.org/2001/XMLSchema" xmlns:p="http://schemas.microsoft.com/office/2006/metadata/properties" xmlns:ns2="f577acbf-5b0b-4b4f-9948-268e97f8d3a4" xmlns:ns3="b1e4d6ee-9f6f-43f8-a618-24f3d84da28f" targetNamespace="http://schemas.microsoft.com/office/2006/metadata/properties" ma:root="true" ma:fieldsID="e4e3c9c8ed1c3d723d02c9f1cb24d19a" ns2:_="" ns3:_="">
     <xsd:import namespace="f577acbf-5b0b-4b4f-9948-268e97f8d3a4"/>
@@ -4154,32 +4381,25 @@
 </ct:contentTypeSchema>
 </file>
 
-<file path=customXml/itemProps1.xml><?xml version="1.0" encoding="utf-8"?>
-<ds:datastoreItem xmlns:ds="http://schemas.openxmlformats.org/officeDocument/2006/customXml" ds:itemID="{617AB1FA-2F28-4684-9230-02ACEB6C0B0A}">
-  <ds:schemaRefs>
-    <ds:schemaRef ds:uri="http://purl.org/dc/elements/1.1/"/>
-    <ds:schemaRef ds:uri="http://schemas.microsoft.com/office/2006/metadata/properties"/>
-    <ds:schemaRef ds:uri="b1e4d6ee-9f6f-43f8-a618-24f3d84da28f"/>
-    <ds:schemaRef ds:uri="http://schemas.microsoft.com/office/2006/documentManagement/types"/>
-    <ds:schemaRef ds:uri="http://purl.org/dc/terms/"/>
-    <ds:schemaRef ds:uri="http://schemas.openxmlformats.org/package/2006/metadata/core-properties"/>
-    <ds:schemaRef ds:uri="f577acbf-5b0b-4b4f-9948-268e97f8d3a4"/>
-    <ds:schemaRef ds:uri="http://purl.org/dc/dcmitype/"/>
-    <ds:schemaRef ds:uri="http://schemas.microsoft.com/office/infopath/2007/PartnerControls"/>
-    <ds:schemaRef ds:uri="http://www.w3.org/XML/1998/namespace"/>
-  </ds:schemaRefs>
-</ds:datastoreItem>
+<file path=customXml/item2.xml><?xml version="1.0" encoding="utf-8"?>
+<?mso-contentType ?>
+<FormTemplates xmlns="http://schemas.microsoft.com/sharepoint/v3/contenttype/forms">
+  <Display>DocumentLibraryForm</Display>
+  <Edit>DocumentLibraryForm</Edit>
+  <New>DocumentLibraryForm</New>
+</FormTemplates>
 </file>
 
-<file path=customXml/itemProps2.xml><?xml version="1.0" encoding="utf-8"?>
-<ds:datastoreItem xmlns:ds="http://schemas.openxmlformats.org/officeDocument/2006/customXml" ds:itemID="{E21AFCC0-734A-4A90-A597-A1CB34860DCD}">
-  <ds:schemaRefs>
-    <ds:schemaRef ds:uri="http://schemas.microsoft.com/sharepoint/v3/contenttype/forms"/>
-  </ds:schemaRefs>
-</ds:datastoreItem>
+<file path=customXml/item3.xml><?xml version="1.0" encoding="utf-8"?>
+<p:properties xmlns:p="http://schemas.microsoft.com/office/2006/metadata/properties" xmlns:xsi="http://www.w3.org/2001/XMLSchema-instance" xmlns:pc="http://schemas.microsoft.com/office/infopath/2007/PartnerControls">
+  <documentManagement>
+    <Document_x0020_Purpose xmlns="f577acbf-5b0b-4b4f-9948-268e97f8d3a4">Informational</Document_x0020_Purpose>
+    <Initiatives xmlns="f577acbf-5b0b-4b4f-9948-268e97f8d3a4"/>
+  </documentManagement>
+</p:properties>
 </file>
 
-<file path=customXml/itemProps3.xml><?xml version="1.0" encoding="utf-8"?>
+<file path=customXml/itemProps1.xml><?xml version="1.0" encoding="utf-8"?>
 <ds:datastoreItem xmlns:ds="http://schemas.openxmlformats.org/officeDocument/2006/customXml" ds:itemID="{1DD29C39-1C4E-4B06-A1F4-2510F2DACF6E}">
   <ds:schemaRefs>
     <ds:schemaRef ds:uri="http://schemas.microsoft.com/office/2006/metadata/contentType"/>
@@ -4196,4 +4416,29 @@
     <ds:schemaRef ds:uri="http://schemas.microsoft.com/internal/obd"/>
   </ds:schemaRefs>
 </ds:datastoreItem>
+</file>
+
+<file path=customXml/itemProps2.xml><?xml version="1.0" encoding="utf-8"?>
+<ds:datastoreItem xmlns:ds="http://schemas.openxmlformats.org/officeDocument/2006/customXml" ds:itemID="{E21AFCC0-734A-4A90-A597-A1CB34860DCD}">
+  <ds:schemaRefs>
+    <ds:schemaRef ds:uri="http://schemas.microsoft.com/sharepoint/v3/contenttype/forms"/>
+  </ds:schemaRefs>
+</ds:datastoreItem>
+</file>
+
+<file path=customXml/itemProps3.xml><?xml version="1.0" encoding="utf-8"?>
+<ds:datastoreItem xmlns:ds="http://schemas.openxmlformats.org/officeDocument/2006/customXml" ds:itemID="{617AB1FA-2F28-4684-9230-02ACEB6C0B0A}">
+  <ds:schemaRefs>
+    <ds:schemaRef ds:uri="http://purl.org/dc/elements/1.1/"/>
+    <ds:schemaRef ds:uri="http://schemas.microsoft.com/office/2006/metadata/properties"/>
+    <ds:schemaRef ds:uri="b1e4d6ee-9f6f-43f8-a618-24f3d84da28f"/>
+    <ds:schemaRef ds:uri="http://schemas.microsoft.com/office/2006/documentManagement/types"/>
+    <ds:schemaRef ds:uri="http://purl.org/dc/terms/"/>
+    <ds:schemaRef ds:uri="http://schemas.openxmlformats.org/package/2006/metadata/core-properties"/>
+    <ds:schemaRef ds:uri="f577acbf-5b0b-4b4f-9948-268e97f8d3a4"/>
+    <ds:schemaRef ds:uri="http://purl.org/dc/dcmitype/"/>
+    <ds:schemaRef ds:uri="http://schemas.microsoft.com/office/infopath/2007/PartnerControls"/>
+    <ds:schemaRef ds:uri="http://www.w3.org/XML/1998/namespace"/>
+  </ds:schemaRefs>
+</ds:datastoreItem>
 </file>
</xml_diff>